<commit_message>
Working on presentation and speech
</commit_message>
<xml_diff>
--- a/note/presentation.pptx
+++ b/note/presentation.pptx
@@ -233,7 +233,7 @@
           <a:p>
             <a:fld id="{09B83821-7846-4B57-B17F-F536755A5E39}" type="datetimeFigureOut">
               <a:rPr lang="ru-RU" smtClean="0"/>
-              <a:t>30.05.2020</a:t>
+              <a:t>31.05.2020</a:t>
             </a:fld>
             <a:endParaRPr lang="ru-RU"/>
           </a:p>
@@ -631,7 +631,7 @@
           <a:p>
             <a:fld id="{6B4585E1-A3EF-456D-AD29-E9F4B3D52110}" type="datetimeFigureOut">
               <a:rPr lang="ru-RU" smtClean="0"/>
-              <a:t>30.05.2020</a:t>
+              <a:t>31.05.2020</a:t>
             </a:fld>
             <a:endParaRPr lang="ru-RU" dirty="0"/>
           </a:p>
@@ -801,7 +801,7 @@
           <a:p>
             <a:fld id="{6B4585E1-A3EF-456D-AD29-E9F4B3D52110}" type="datetimeFigureOut">
               <a:rPr lang="ru-RU" smtClean="0"/>
-              <a:t>30.05.2020</a:t>
+              <a:t>31.05.2020</a:t>
             </a:fld>
             <a:endParaRPr lang="ru-RU" dirty="0"/>
           </a:p>
@@ -981,7 +981,7 @@
           <a:p>
             <a:fld id="{6B4585E1-A3EF-456D-AD29-E9F4B3D52110}" type="datetimeFigureOut">
               <a:rPr lang="ru-RU" smtClean="0"/>
-              <a:t>30.05.2020</a:t>
+              <a:t>31.05.2020</a:t>
             </a:fld>
             <a:endParaRPr lang="ru-RU" dirty="0"/>
           </a:p>
@@ -1151,7 +1151,7 @@
           <a:p>
             <a:fld id="{6B4585E1-A3EF-456D-AD29-E9F4B3D52110}" type="datetimeFigureOut">
               <a:rPr lang="ru-RU" smtClean="0"/>
-              <a:t>30.05.2020</a:t>
+              <a:t>31.05.2020</a:t>
             </a:fld>
             <a:endParaRPr lang="ru-RU" dirty="0"/>
           </a:p>
@@ -1395,7 +1395,7 @@
           <a:p>
             <a:fld id="{6B4585E1-A3EF-456D-AD29-E9F4B3D52110}" type="datetimeFigureOut">
               <a:rPr lang="ru-RU" smtClean="0"/>
-              <a:t>30.05.2020</a:t>
+              <a:t>31.05.2020</a:t>
             </a:fld>
             <a:endParaRPr lang="ru-RU" dirty="0"/>
           </a:p>
@@ -1627,7 +1627,7 @@
           <a:p>
             <a:fld id="{6B4585E1-A3EF-456D-AD29-E9F4B3D52110}" type="datetimeFigureOut">
               <a:rPr lang="ru-RU" smtClean="0"/>
-              <a:t>30.05.2020</a:t>
+              <a:t>31.05.2020</a:t>
             </a:fld>
             <a:endParaRPr lang="ru-RU" dirty="0"/>
           </a:p>
@@ -1994,7 +1994,7 @@
           <a:p>
             <a:fld id="{6B4585E1-A3EF-456D-AD29-E9F4B3D52110}" type="datetimeFigureOut">
               <a:rPr lang="ru-RU" smtClean="0"/>
-              <a:t>30.05.2020</a:t>
+              <a:t>31.05.2020</a:t>
             </a:fld>
             <a:endParaRPr lang="ru-RU" dirty="0"/>
           </a:p>
@@ -2112,7 +2112,7 @@
           <a:p>
             <a:fld id="{6B4585E1-A3EF-456D-AD29-E9F4B3D52110}" type="datetimeFigureOut">
               <a:rPr lang="ru-RU" smtClean="0"/>
-              <a:t>30.05.2020</a:t>
+              <a:t>31.05.2020</a:t>
             </a:fld>
             <a:endParaRPr lang="ru-RU" dirty="0"/>
           </a:p>
@@ -2207,7 +2207,7 @@
           <a:p>
             <a:fld id="{6B4585E1-A3EF-456D-AD29-E9F4B3D52110}" type="datetimeFigureOut">
               <a:rPr lang="ru-RU" smtClean="0"/>
-              <a:t>30.05.2020</a:t>
+              <a:t>31.05.2020</a:t>
             </a:fld>
             <a:endParaRPr lang="ru-RU" dirty="0"/>
           </a:p>
@@ -2484,7 +2484,7 @@
           <a:p>
             <a:fld id="{6B4585E1-A3EF-456D-AD29-E9F4B3D52110}" type="datetimeFigureOut">
               <a:rPr lang="ru-RU" smtClean="0"/>
-              <a:t>30.05.2020</a:t>
+              <a:t>31.05.2020</a:t>
             </a:fld>
             <a:endParaRPr lang="ru-RU" dirty="0"/>
           </a:p>
@@ -2741,7 +2741,7 @@
           <a:p>
             <a:fld id="{6B4585E1-A3EF-456D-AD29-E9F4B3D52110}" type="datetimeFigureOut">
               <a:rPr lang="ru-RU" smtClean="0"/>
-              <a:t>30.05.2020</a:t>
+              <a:t>31.05.2020</a:t>
             </a:fld>
             <a:endParaRPr lang="ru-RU" dirty="0"/>
           </a:p>
@@ -2954,7 +2954,7 @@
           <a:p>
             <a:fld id="{6B4585E1-A3EF-456D-AD29-E9F4B3D52110}" type="datetimeFigureOut">
               <a:rPr lang="ru-RU" smtClean="0"/>
-              <a:t>30.05.2020</a:t>
+              <a:t>31.05.2020</a:t>
             </a:fld>
             <a:endParaRPr lang="ru-RU" dirty="0"/>
           </a:p>
@@ -3481,7 +3481,7 @@
                 <a:latin typeface="Times New Roman" panose="02020603050405020304" pitchFamily="18" charset="0"/>
                 <a:cs typeface="Times New Roman" panose="02020603050405020304" pitchFamily="18" charset="0"/>
               </a:rPr>
-              <a:t>Т.С. Боброва</a:t>
+              <a:t>В.Л. Арановский</a:t>
             </a:r>
           </a:p>
           <a:p>
@@ -3498,7 +3498,7 @@
                 <a:latin typeface="Times New Roman" panose="02020603050405020304" pitchFamily="18" charset="0"/>
                 <a:cs typeface="Times New Roman" panose="02020603050405020304" pitchFamily="18" charset="0"/>
               </a:rPr>
-              <a:t>Старший преподаватель кафедры ИТАС</a:t>
+              <a:t>Начальник отдела</a:t>
             </a:r>
           </a:p>
         </p:txBody>
@@ -4718,7 +4718,7 @@
         <p:spPr>
           <a:xfrm>
             <a:off x="222422" y="184219"/>
-            <a:ext cx="8608540" cy="2185214"/>
+            <a:ext cx="8608540" cy="2123658"/>
           </a:xfrm>
           <a:prstGeom prst="rect">
             <a:avLst/>
@@ -4780,7 +4780,7 @@
                 <a:latin typeface="Times New Roman" panose="02020603050405020304" pitchFamily="18" charset="0"/>
                 <a:cs typeface="Times New Roman" panose="02020603050405020304" pitchFamily="18" charset="0"/>
               </a:rPr>
-              <a:t>автоматизированной системы заказов билетов на междугородний пассажирский транспорт.</a:t>
+              <a:t>автоматизированной системы управления полочным пространством супермаркета.</a:t>
             </a:r>
             <a:endParaRPr lang="ru-RU" sz="3600" dirty="0">
               <a:solidFill>
@@ -4801,7 +4801,7 @@
         <p:spPr>
           <a:xfrm>
             <a:off x="222422" y="2369433"/>
-            <a:ext cx="8608540" cy="3600986"/>
+            <a:ext cx="8717392" cy="3600986"/>
           </a:xfrm>
           <a:prstGeom prst="rect">
             <a:avLst/>
@@ -4862,7 +4862,7 @@
                 <a:latin typeface="Times New Roman" panose="02020603050405020304" pitchFamily="18" charset="0"/>
                 <a:cs typeface="Times New Roman" panose="02020603050405020304" pitchFamily="18" charset="0"/>
               </a:rPr>
-              <a:t>Спроектировать информационную систему</a:t>
+              <a:t>Спроектировать автоматизированную систему</a:t>
             </a:r>
           </a:p>
           <a:p>
@@ -4880,7 +4880,7 @@
                 <a:latin typeface="Times New Roman" panose="02020603050405020304" pitchFamily="18" charset="0"/>
                 <a:cs typeface="Times New Roman" panose="02020603050405020304" pitchFamily="18" charset="0"/>
               </a:rPr>
-              <a:t>Разработать информационную систему</a:t>
+              <a:t>Разработать автоматизированную систему</a:t>
             </a:r>
           </a:p>
           <a:p>
@@ -4905,7 +4905,7 @@
                 <a:latin typeface="Times New Roman" panose="02020603050405020304" pitchFamily="18" charset="0"/>
                 <a:cs typeface="Times New Roman" panose="02020603050405020304" pitchFamily="18" charset="0"/>
               </a:rPr>
-              <a:t>технико-экономическое обоснование разработки</a:t>
+              <a:t>технико-экономическое обоснование разработки и использования</a:t>
             </a:r>
             <a:endParaRPr lang="ru-RU" sz="3200" dirty="0">
               <a:effectLst>
@@ -5021,7 +5021,7 @@
                 <a:latin typeface="Times New Roman" panose="02020603050405020304" pitchFamily="18" charset="0"/>
                 <a:cs typeface="Times New Roman" panose="02020603050405020304" pitchFamily="18" charset="0"/>
               </a:rPr>
-              <a:t>Регистрация маршрута</a:t>
+              <a:t>Автоматизация управления полками супермаркета</a:t>
             </a:r>
           </a:p>
           <a:p>
@@ -5031,7 +5031,7 @@
                 <a:latin typeface="Times New Roman" panose="02020603050405020304" pitchFamily="18" charset="0"/>
                 <a:cs typeface="Times New Roman" panose="02020603050405020304" pitchFamily="18" charset="0"/>
               </a:rPr>
-              <a:t>Поиск маршрутов</a:t>
+              <a:t>Автоматизация управления складом супермаркета</a:t>
             </a:r>
           </a:p>
           <a:p>
@@ -5041,7 +5041,7 @@
                 <a:latin typeface="Times New Roman" panose="02020603050405020304" pitchFamily="18" charset="0"/>
                 <a:cs typeface="Times New Roman" panose="02020603050405020304" pitchFamily="18" charset="0"/>
               </a:rPr>
-              <a:t>Бронирование мест</a:t>
+              <a:t>Создание заданий и назначение заданий</a:t>
             </a:r>
           </a:p>
           <a:p>
@@ -5051,7 +5051,7 @@
                 <a:latin typeface="Times New Roman" panose="02020603050405020304" pitchFamily="18" charset="0"/>
                 <a:cs typeface="Times New Roman" panose="02020603050405020304" pitchFamily="18" charset="0"/>
               </a:rPr>
-              <a:t>Просмотр заказанных мест</a:t>
+              <a:t>Назначение ответственности за полки супермаркета</a:t>
             </a:r>
           </a:p>
           <a:p>
@@ -5061,7 +5061,7 @@
                 <a:latin typeface="Times New Roman" panose="02020603050405020304" pitchFamily="18" charset="0"/>
                 <a:cs typeface="Times New Roman" panose="02020603050405020304" pitchFamily="18" charset="0"/>
               </a:rPr>
-              <a:t>Отказ от заказанных мест</a:t>
+              <a:t>Управление продуктами супермаркета</a:t>
             </a:r>
           </a:p>
           <a:p>
@@ -5071,7 +5071,7 @@
                 <a:latin typeface="Times New Roman" panose="02020603050405020304" pitchFamily="18" charset="0"/>
                 <a:cs typeface="Times New Roman" panose="02020603050405020304" pitchFamily="18" charset="0"/>
               </a:rPr>
-              <a:t>Оставить отзыв о маршруте</a:t>
+              <a:t>Анализ вводимых данных</a:t>
             </a:r>
           </a:p>
           <a:p>
@@ -5081,7 +5081,7 @@
                 <a:latin typeface="Times New Roman" panose="02020603050405020304" pitchFamily="18" charset="0"/>
                 <a:cs typeface="Times New Roman" panose="02020603050405020304" pitchFamily="18" charset="0"/>
               </a:rPr>
-              <a:t>Отказ от маршрута</a:t>
+              <a:t>Построение статистики по введенным данным</a:t>
             </a:r>
           </a:p>
           <a:p>
@@ -5091,7 +5091,7 @@
                 <a:latin typeface="Times New Roman" panose="02020603050405020304" pitchFamily="18" charset="0"/>
                 <a:cs typeface="Times New Roman" panose="02020603050405020304" pitchFamily="18" charset="0"/>
               </a:rPr>
-              <a:t>Просмотр причины отказа от заказанного места</a:t>
+              <a:t>Вывод рекомендаций по количеству продуктов на очередной день</a:t>
             </a:r>
           </a:p>
         </p:txBody>
@@ -5134,8 +5134,8 @@
         </p:nvSpPr>
         <p:spPr>
           <a:xfrm>
-            <a:off x="222422" y="184219"/>
-            <a:ext cx="8608540" cy="6771084"/>
+            <a:off x="267730" y="86916"/>
+            <a:ext cx="8608540" cy="6309420"/>
           </a:xfrm>
           <a:prstGeom prst="rect">
             <a:avLst/>
@@ -5179,21 +5179,7 @@
                 <a:latin typeface="Times New Roman" panose="02020603050405020304" pitchFamily="18" charset="0"/>
                 <a:cs typeface="Times New Roman" panose="02020603050405020304" pitchFamily="18" charset="0"/>
               </a:rPr>
-              <a:t>Актуальность</a:t>
-            </a:r>
-            <a:r>
-              <a:rPr lang="ru-RU" sz="3000" b="1" dirty="0">
-                <a:latin typeface="Times New Roman" panose="02020603050405020304" pitchFamily="18" charset="0"/>
-                <a:cs typeface="Times New Roman" panose="02020603050405020304" pitchFamily="18" charset="0"/>
-              </a:rPr>
-              <a:t> </a:t>
-            </a:r>
-            <a:r>
-              <a:rPr lang="ru-RU" sz="3000" dirty="0">
-                <a:latin typeface="Times New Roman" panose="02020603050405020304" pitchFamily="18" charset="0"/>
-                <a:cs typeface="Times New Roman" panose="02020603050405020304" pitchFamily="18" charset="0"/>
-              </a:rPr>
-              <a:t>данного дипломного проектирования заключается в том, что на данный момент всё больше людей разного возраста начинают пользоваться мобильными телефонами и при этом бронировать билеты и проводить оплаты онлайн. Главным недостатком всех приложений является регистрация, она не позволяет определенному кругу людей пользоваться приложением, однако, если убрать регистрацию, люди всех возрастов смогут пользоваться приложением с максимальной комфортностью. </a:t>
+              <a:t>Супермаркетам необходима минимизация взаимодействия персонала с полочным пространством. Прежде всего это необходимо для того, чтобы в моменты, когда в супермаркете много людей, персонал производил меньшее количество операций, тем самым не загромождая проход и предоставляя максимум комфорта для выбора товаров покупателями. Кроме того, благодаря внедрению системы произойдет минимизация воздействия человеческого фактора.</a:t>
             </a:r>
           </a:p>
         </p:txBody>
@@ -5263,8 +5249,16 @@
       </p:sp>
       <p:pic>
         <p:nvPicPr>
-          <p:cNvPr id="3" name="Рисунок 2" descr="Basic Use Case Diagram Example53 (1)"/>
-          <p:cNvPicPr/>
+          <p:cNvPr id="5" name="Picture 4">
+            <a:extLst>
+              <a:ext uri="{FF2B5EF4-FFF2-40B4-BE49-F238E27FC236}">
+                <a16:creationId xmlns:a16="http://schemas.microsoft.com/office/drawing/2014/main" id="{0CB865DD-3AFF-4044-B287-28F52AEDE814}"/>
+              </a:ext>
+            </a:extLst>
+          </p:cNvPr>
+          <p:cNvPicPr>
+            <a:picLocks noChangeAspect="1"/>
+          </p:cNvPicPr>
           <p:nvPr/>
         </p:nvPicPr>
         <p:blipFill>
@@ -5275,23 +5269,18 @@
               </a:ext>
             </a:extLst>
           </a:blip>
-          <a:srcRect/>
           <a:stretch>
             <a:fillRect/>
           </a:stretch>
         </p:blipFill>
-        <p:spPr bwMode="auto">
-          <a:xfrm>
-            <a:off x="245423" y="1056068"/>
-            <a:ext cx="8705394" cy="5550793"/>
+        <p:spPr>
+          <a:xfrm>
+            <a:off x="1934892" y="1056069"/>
+            <a:ext cx="5274216" cy="5406875"/>
           </a:xfrm>
           <a:prstGeom prst="rect">
             <a:avLst/>
           </a:prstGeom>
-          <a:noFill/>
-          <a:ln>
-            <a:noFill/>
-          </a:ln>
         </p:spPr>
       </p:pic>
     </p:spTree>
@@ -5516,73 +5505,6 @@
           </a:p>
         </p:txBody>
       </p:sp>
-      <p:graphicFrame>
-        <p:nvGraphicFramePr>
-          <p:cNvPr id="4" name="Объект 3"/>
-          <p:cNvGraphicFramePr>
-            <a:graphicFrameLocks noChangeAspect="1"/>
-          </p:cNvGraphicFramePr>
-          <p:nvPr>
-            <p:extLst>
-              <p:ext uri="{D42A27DB-BD31-4B8C-83A1-F6EECF244321}">
-                <p14:modId xmlns:p14="http://schemas.microsoft.com/office/powerpoint/2010/main" val="1091984544"/>
-              </p:ext>
-            </p:extLst>
-          </p:nvPr>
-        </p:nvGraphicFramePr>
-        <p:xfrm>
-          <a:off x="1236373" y="1017431"/>
-          <a:ext cx="6465195" cy="5612774"/>
-        </p:xfrm>
-        <a:graphic>
-          <a:graphicData uri="http://schemas.openxmlformats.org/presentationml/2006/ole">
-            <mc:AlternateContent xmlns:mc="http://schemas.openxmlformats.org/markup-compatibility/2006">
-              <mc:Choice xmlns:v="urn:schemas-microsoft-com:vml" Requires="v">
-                <p:oleObj spid="_x0000_s1037" name="Visio" r:id="rId3" imgW="14525587" imgH="17040247" progId="Visio.Drawing.15">
-                  <p:embed/>
-                </p:oleObj>
-              </mc:Choice>
-              <mc:Fallback>
-                <p:oleObj name="Visio" r:id="rId3" imgW="14525587" imgH="17040247" progId="Visio.Drawing.15">
-                  <p:embed/>
-                  <p:pic>
-                    <p:nvPicPr>
-                      <p:cNvPr id="0" name="Object 1"/>
-                      <p:cNvPicPr>
-                        <a:picLocks noChangeAspect="1" noChangeArrowheads="1"/>
-                      </p:cNvPicPr>
-                      <p:nvPr/>
-                    </p:nvPicPr>
-                    <p:blipFill>
-                      <a:blip r:embed="rId4">
-                        <a:extLst>
-                          <a:ext uri="{28A0092B-C50C-407E-A947-70E740481C1C}">
-                            <a14:useLocalDpi xmlns:a14="http://schemas.microsoft.com/office/drawing/2010/main" val="0"/>
-                          </a:ext>
-                        </a:extLst>
-                      </a:blip>
-                      <a:srcRect/>
-                      <a:stretch>
-                        <a:fillRect/>
-                      </a:stretch>
-                    </p:blipFill>
-                    <p:spPr bwMode="auto">
-                      <a:xfrm>
-                        <a:off x="1236373" y="1017431"/>
-                        <a:ext cx="6465195" cy="5612774"/>
-                      </a:xfrm>
-                      <a:prstGeom prst="rect">
-                        <a:avLst/>
-                      </a:prstGeom>
-                      <a:noFill/>
-                    </p:spPr>
-                  </p:pic>
-                </p:oleObj>
-              </mc:Fallback>
-            </mc:AlternateContent>
-          </a:graphicData>
-        </a:graphic>
-      </p:graphicFrame>
     </p:spTree>
     <p:extLst>
       <p:ext uri="{BB962C8B-B14F-4D97-AF65-F5344CB8AC3E}">
@@ -5731,7 +5653,7 @@
           <a:graphicData uri="http://schemas.openxmlformats.org/presentationml/2006/ole">
             <mc:AlternateContent xmlns:mc="http://schemas.openxmlformats.org/markup-compatibility/2006">
               <mc:Choice xmlns:v="urn:schemas-microsoft-com:vml" Requires="v">
-                <p:oleObj spid="_x0000_s2061" name="Visio" r:id="rId3" imgW="3762265" imgH="10144249" progId="Visio.Drawing.15">
+                <p:oleObj spid="_x0000_s2070" name="Visio" r:id="rId3" imgW="3762265" imgH="10144249" progId="Visio.Drawing.15">
                   <p:embed/>
                 </p:oleObj>
               </mc:Choice>

</xml_diff>

<commit_message>
Presentation finished, working on speech
</commit_message>
<xml_diff>
--- a/note/presentation.pptx
+++ b/note/presentation.pptx
@@ -233,7 +233,7 @@
           <a:p>
             <a:fld id="{09B83821-7846-4B57-B17F-F536755A5E39}" type="datetimeFigureOut">
               <a:rPr lang="ru-RU" smtClean="0"/>
-              <a:t>31.05.2020</a:t>
+              <a:t>01.06.2020</a:t>
             </a:fld>
             <a:endParaRPr lang="ru-RU"/>
           </a:p>
@@ -631,7 +631,7 @@
           <a:p>
             <a:fld id="{6B4585E1-A3EF-456D-AD29-E9F4B3D52110}" type="datetimeFigureOut">
               <a:rPr lang="ru-RU" smtClean="0"/>
-              <a:t>31.05.2020</a:t>
+              <a:t>01.06.2020</a:t>
             </a:fld>
             <a:endParaRPr lang="ru-RU" dirty="0"/>
           </a:p>
@@ -801,7 +801,7 @@
           <a:p>
             <a:fld id="{6B4585E1-A3EF-456D-AD29-E9F4B3D52110}" type="datetimeFigureOut">
               <a:rPr lang="ru-RU" smtClean="0"/>
-              <a:t>31.05.2020</a:t>
+              <a:t>01.06.2020</a:t>
             </a:fld>
             <a:endParaRPr lang="ru-RU" dirty="0"/>
           </a:p>
@@ -981,7 +981,7 @@
           <a:p>
             <a:fld id="{6B4585E1-A3EF-456D-AD29-E9F4B3D52110}" type="datetimeFigureOut">
               <a:rPr lang="ru-RU" smtClean="0"/>
-              <a:t>31.05.2020</a:t>
+              <a:t>01.06.2020</a:t>
             </a:fld>
             <a:endParaRPr lang="ru-RU" dirty="0"/>
           </a:p>
@@ -1151,7 +1151,7 @@
           <a:p>
             <a:fld id="{6B4585E1-A3EF-456D-AD29-E9F4B3D52110}" type="datetimeFigureOut">
               <a:rPr lang="ru-RU" smtClean="0"/>
-              <a:t>31.05.2020</a:t>
+              <a:t>01.06.2020</a:t>
             </a:fld>
             <a:endParaRPr lang="ru-RU" dirty="0"/>
           </a:p>
@@ -1395,7 +1395,7 @@
           <a:p>
             <a:fld id="{6B4585E1-A3EF-456D-AD29-E9F4B3D52110}" type="datetimeFigureOut">
               <a:rPr lang="ru-RU" smtClean="0"/>
-              <a:t>31.05.2020</a:t>
+              <a:t>01.06.2020</a:t>
             </a:fld>
             <a:endParaRPr lang="ru-RU" dirty="0"/>
           </a:p>
@@ -1627,7 +1627,7 @@
           <a:p>
             <a:fld id="{6B4585E1-A3EF-456D-AD29-E9F4B3D52110}" type="datetimeFigureOut">
               <a:rPr lang="ru-RU" smtClean="0"/>
-              <a:t>31.05.2020</a:t>
+              <a:t>01.06.2020</a:t>
             </a:fld>
             <a:endParaRPr lang="ru-RU" dirty="0"/>
           </a:p>
@@ -1994,7 +1994,7 @@
           <a:p>
             <a:fld id="{6B4585E1-A3EF-456D-AD29-E9F4B3D52110}" type="datetimeFigureOut">
               <a:rPr lang="ru-RU" smtClean="0"/>
-              <a:t>31.05.2020</a:t>
+              <a:t>01.06.2020</a:t>
             </a:fld>
             <a:endParaRPr lang="ru-RU" dirty="0"/>
           </a:p>
@@ -2112,7 +2112,7 @@
           <a:p>
             <a:fld id="{6B4585E1-A3EF-456D-AD29-E9F4B3D52110}" type="datetimeFigureOut">
               <a:rPr lang="ru-RU" smtClean="0"/>
-              <a:t>31.05.2020</a:t>
+              <a:t>01.06.2020</a:t>
             </a:fld>
             <a:endParaRPr lang="ru-RU" dirty="0"/>
           </a:p>
@@ -2207,7 +2207,7 @@
           <a:p>
             <a:fld id="{6B4585E1-A3EF-456D-AD29-E9F4B3D52110}" type="datetimeFigureOut">
               <a:rPr lang="ru-RU" smtClean="0"/>
-              <a:t>31.05.2020</a:t>
+              <a:t>01.06.2020</a:t>
             </a:fld>
             <a:endParaRPr lang="ru-RU" dirty="0"/>
           </a:p>
@@ -2484,7 +2484,7 @@
           <a:p>
             <a:fld id="{6B4585E1-A3EF-456D-AD29-E9F4B3D52110}" type="datetimeFigureOut">
               <a:rPr lang="ru-RU" smtClean="0"/>
-              <a:t>31.05.2020</a:t>
+              <a:t>01.06.2020</a:t>
             </a:fld>
             <a:endParaRPr lang="ru-RU" dirty="0"/>
           </a:p>
@@ -2741,7 +2741,7 @@
           <a:p>
             <a:fld id="{6B4585E1-A3EF-456D-AD29-E9F4B3D52110}" type="datetimeFigureOut">
               <a:rPr lang="ru-RU" smtClean="0"/>
-              <a:t>31.05.2020</a:t>
+              <a:t>01.06.2020</a:t>
             </a:fld>
             <a:endParaRPr lang="ru-RU" dirty="0"/>
           </a:p>
@@ -2954,7 +2954,7 @@
           <a:p>
             <a:fld id="{6B4585E1-A3EF-456D-AD29-E9F4B3D52110}" type="datetimeFigureOut">
               <a:rPr lang="ru-RU" smtClean="0"/>
-              <a:t>31.05.2020</a:t>
+              <a:t>01.06.2020</a:t>
             </a:fld>
             <a:endParaRPr lang="ru-RU" dirty="0"/>
           </a:p>
@@ -3801,15 +3801,23 @@
                 <a:latin typeface="Times New Roman" panose="02020603050405020304" pitchFamily="18" charset="0"/>
                 <a:cs typeface="Times New Roman" panose="02020603050405020304" pitchFamily="18" charset="0"/>
               </a:rPr>
-              <a:t>Структура программного обеспечения</a:t>
+              <a:t>Интерфейс системы</a:t>
             </a:r>
           </a:p>
         </p:txBody>
       </p:sp>
       <p:pic>
         <p:nvPicPr>
-          <p:cNvPr id="3" name="Рисунок 2" descr="Account Ownership Diagram Template (13)"/>
-          <p:cNvPicPr/>
+          <p:cNvPr id="7" name="Picture 6">
+            <a:extLst>
+              <a:ext uri="{FF2B5EF4-FFF2-40B4-BE49-F238E27FC236}">
+                <a16:creationId xmlns:a16="http://schemas.microsoft.com/office/drawing/2014/main" id="{E1F8D339-4704-4917-A4AA-56B6B5374FFD}"/>
+              </a:ext>
+            </a:extLst>
+          </p:cNvPr>
+          <p:cNvPicPr>
+            <a:picLocks noChangeAspect="1"/>
+          </p:cNvPicPr>
           <p:nvPr/>
         </p:nvPicPr>
         <p:blipFill>
@@ -3820,23 +3828,18 @@
               </a:ext>
             </a:extLst>
           </a:blip>
-          <a:srcRect/>
           <a:stretch>
             <a:fillRect/>
           </a:stretch>
         </p:blipFill>
-        <p:spPr bwMode="auto">
-          <a:xfrm>
-            <a:off x="953037" y="927279"/>
-            <a:ext cx="6909515" cy="5930721"/>
+        <p:spPr>
+          <a:xfrm>
+            <a:off x="267814" y="927279"/>
+            <a:ext cx="8608372" cy="5637423"/>
           </a:xfrm>
           <a:prstGeom prst="rect">
             <a:avLst/>
           </a:prstGeom>
-          <a:noFill/>
-          <a:ln>
-            <a:noFill/>
-          </a:ln>
         </p:spPr>
       </p:pic>
     </p:spTree>
@@ -3897,7 +3900,7 @@
                 <a:latin typeface="Times New Roman" panose="02020603050405020304" pitchFamily="18" charset="0"/>
                 <a:cs typeface="Times New Roman" panose="02020603050405020304" pitchFamily="18" charset="0"/>
               </a:rPr>
-              <a:t>Перечень использованных технологий и  средств разработки</a:t>
+              <a:t>Использованные технологии и средства разработки</a:t>
             </a:r>
             <a:endParaRPr lang="ru-RU" sz="3600" dirty="0">
               <a:latin typeface="Times New Roman" panose="02020603050405020304" pitchFamily="18" charset="0"/>
@@ -3939,7 +3942,7 @@
                 <a:ea typeface="Calibri" panose="020F0502020204030204" pitchFamily="34" charset="0"/>
                 <a:cs typeface="Times New Roman" panose="02020603050405020304" pitchFamily="18" charset="0"/>
               </a:rPr>
-              <a:t>Среда разработки</a:t>
+              <a:t>Редактор исходного кода</a:t>
             </a:r>
             <a:endParaRPr lang="en-US" dirty="0">
               <a:latin typeface="Times New Roman" panose="02020603050405020304" pitchFamily="18" charset="0"/>
@@ -3954,37 +3957,18 @@
               </a:lnSpc>
             </a:pPr>
             <a:r>
-              <a:rPr lang="en-US" dirty="0">
+              <a:rPr lang="en-US" i="1" dirty="0">
                 <a:latin typeface="Times New Roman" panose="02020603050405020304" pitchFamily="18" charset="0"/>
                 <a:ea typeface="Calibri" panose="020F0502020204030204" pitchFamily="34" charset="0"/>
                 <a:cs typeface="Times New Roman" panose="02020603050405020304" pitchFamily="18" charset="0"/>
               </a:rPr>
-              <a:t>    </a:t>
-            </a:r>
-            <a:r>
-              <a:rPr lang="ru-RU" dirty="0">
-                <a:latin typeface="Times New Roman" panose="02020603050405020304" pitchFamily="18" charset="0"/>
-                <a:ea typeface="Calibri" panose="020F0502020204030204" pitchFamily="34" charset="0"/>
-                <a:cs typeface="Times New Roman" panose="02020603050405020304" pitchFamily="18" charset="0"/>
-              </a:rPr>
-              <a:t> </a:t>
-            </a:r>
-            <a:r>
-              <a:rPr lang="en-US" i="1" dirty="0">
-                <a:latin typeface="Times New Roman" panose="02020603050405020304" pitchFamily="18" charset="0"/>
-                <a:ea typeface="Calibri" panose="020F0502020204030204" pitchFamily="34" charset="0"/>
-                <a:cs typeface="Times New Roman" panose="02020603050405020304" pitchFamily="18" charset="0"/>
-              </a:rPr>
-              <a:t>Android Studio </a:t>
-            </a:r>
-            <a:r>
-              <a:rPr lang="en-US" dirty="0">
-                <a:latin typeface="Times New Roman" panose="02020603050405020304" pitchFamily="18" charset="0"/>
-                <a:ea typeface="Calibri" panose="020F0502020204030204" pitchFamily="34" charset="0"/>
-                <a:cs typeface="Times New Roman" panose="02020603050405020304" pitchFamily="18" charset="0"/>
-              </a:rPr>
-              <a:t>3.4</a:t>
-            </a:r>
+              <a:t>   Visual Studio Code</a:t>
+            </a:r>
+            <a:endParaRPr lang="en-US" dirty="0">
+              <a:latin typeface="Times New Roman" panose="02020603050405020304" pitchFamily="18" charset="0"/>
+              <a:ea typeface="Calibri" panose="020F0502020204030204" pitchFamily="34" charset="0"/>
+              <a:cs typeface="Times New Roman" panose="02020603050405020304" pitchFamily="18" charset="0"/>
+            </a:endParaRPr>
           </a:p>
           <a:p>
             <a:pPr marL="257162" indent="-257162" algn="just">
@@ -4000,25 +3984,9 @@
                 <a:ea typeface="Calibri" panose="020F0502020204030204" pitchFamily="34" charset="0"/>
                 <a:cs typeface="Times New Roman" panose="02020603050405020304" pitchFamily="18" charset="0"/>
               </a:rPr>
-              <a:t>Браузера </a:t>
-            </a:r>
-            <a:r>
-              <a:rPr lang="en-US" i="1" dirty="0" err="1">
-                <a:latin typeface="Times New Roman" panose="02020603050405020304" pitchFamily="18" charset="0"/>
-                <a:ea typeface="Calibri" panose="020F0502020204030204" pitchFamily="34" charset="0"/>
-                <a:cs typeface="Times New Roman" panose="02020603050405020304" pitchFamily="18" charset="0"/>
-              </a:rPr>
-              <a:t>FireFox</a:t>
-            </a:r>
-            <a:r>
-              <a:rPr lang="en-US" dirty="0">
-                <a:latin typeface="Times New Roman" panose="02020603050405020304" pitchFamily="18" charset="0"/>
-                <a:ea typeface="Calibri" panose="020F0502020204030204" pitchFamily="34" charset="0"/>
-                <a:cs typeface="Times New Roman" panose="02020603050405020304" pitchFamily="18" charset="0"/>
-              </a:rPr>
-              <a:t>, </a:t>
-            </a:r>
-            <a:endParaRPr lang="ru-RU" dirty="0">
+              <a:t>Браузеры </a:t>
+            </a:r>
+            <a:endParaRPr lang="en-US" dirty="0">
               <a:latin typeface="Times New Roman" panose="02020603050405020304" pitchFamily="18" charset="0"/>
               <a:ea typeface="Calibri" panose="020F0502020204030204" pitchFamily="34" charset="0"/>
               <a:cs typeface="Times New Roman" panose="02020603050405020304" pitchFamily="18" charset="0"/>
@@ -4031,12 +3999,44 @@
               </a:lnSpc>
             </a:pPr>
             <a:r>
+              <a:rPr lang="en-US" i="1" dirty="0">
+                <a:latin typeface="Times New Roman" panose="02020603050405020304" pitchFamily="18" charset="0"/>
+                <a:ea typeface="Calibri" panose="020F0502020204030204" pitchFamily="34" charset="0"/>
+                <a:cs typeface="Times New Roman" panose="02020603050405020304" pitchFamily="18" charset="0"/>
+              </a:rPr>
+              <a:t>   </a:t>
+            </a:r>
+            <a:r>
+              <a:rPr lang="en-US" i="1" dirty="0" err="1">
+                <a:latin typeface="Times New Roman" panose="02020603050405020304" pitchFamily="18" charset="0"/>
+                <a:ea typeface="Calibri" panose="020F0502020204030204" pitchFamily="34" charset="0"/>
+                <a:cs typeface="Times New Roman" panose="02020603050405020304" pitchFamily="18" charset="0"/>
+              </a:rPr>
+              <a:t>FireFox</a:t>
+            </a:r>
+            <a:r>
+              <a:rPr lang="en-US" dirty="0">
+                <a:latin typeface="Times New Roman" panose="02020603050405020304" pitchFamily="18" charset="0"/>
+                <a:ea typeface="Calibri" panose="020F0502020204030204" pitchFamily="34" charset="0"/>
+                <a:cs typeface="Times New Roman" panose="02020603050405020304" pitchFamily="18" charset="0"/>
+              </a:rPr>
+              <a:t>, </a:t>
+            </a:r>
+            <a:r>
+              <a:rPr lang="en-US" i="1" dirty="0">
+                <a:latin typeface="Times New Roman" panose="02020603050405020304" pitchFamily="18" charset="0"/>
+                <a:ea typeface="Calibri" panose="020F0502020204030204" pitchFamily="34" charset="0"/>
+                <a:cs typeface="Times New Roman" panose="02020603050405020304" pitchFamily="18" charset="0"/>
+              </a:rPr>
+              <a:t>Chrome</a:t>
+            </a:r>
+            <a:r>
               <a:rPr lang="ru-RU" i="1" dirty="0">
                 <a:latin typeface="Times New Roman" panose="02020603050405020304" pitchFamily="18" charset="0"/>
                 <a:ea typeface="Calibri" panose="020F0502020204030204" pitchFamily="34" charset="0"/>
                 <a:cs typeface="Times New Roman" panose="02020603050405020304" pitchFamily="18" charset="0"/>
               </a:rPr>
-              <a:t> </a:t>
+              <a:t>, </a:t>
             </a:r>
             <a:r>
               <a:rPr lang="en-US" i="1" dirty="0">
@@ -4044,23 +4044,7 @@
                 <a:ea typeface="Calibri" panose="020F0502020204030204" pitchFamily="34" charset="0"/>
                 <a:cs typeface="Times New Roman" panose="02020603050405020304" pitchFamily="18" charset="0"/>
               </a:rPr>
-              <a:t>Chrome</a:t>
-            </a:r>
-            <a:r>
-              <a:rPr lang="en-US" dirty="0">
-                <a:latin typeface="Times New Roman" panose="02020603050405020304" pitchFamily="18" charset="0"/>
-                <a:ea typeface="Calibri" panose="020F0502020204030204" pitchFamily="34" charset="0"/>
-                <a:cs typeface="Times New Roman" panose="02020603050405020304" pitchFamily="18" charset="0"/>
-              </a:rPr>
-              <a:t>, </a:t>
-            </a:r>
-            <a:r>
-              <a:rPr lang="en-US" i="1" dirty="0">
-                <a:latin typeface="Times New Roman" panose="02020603050405020304" pitchFamily="18" charset="0"/>
-                <a:ea typeface="Calibri" panose="020F0502020204030204" pitchFamily="34" charset="0"/>
-                <a:cs typeface="Times New Roman" panose="02020603050405020304" pitchFamily="18" charset="0"/>
-              </a:rPr>
-              <a:t>Internet Explorer</a:t>
+              <a:t>Microsoft Edge</a:t>
             </a:r>
           </a:p>
           <a:p>
@@ -4077,7 +4061,35 @@
                 <a:ea typeface="Calibri" panose="020F0502020204030204" pitchFamily="34" charset="0"/>
                 <a:cs typeface="Times New Roman" panose="02020603050405020304" pitchFamily="18" charset="0"/>
               </a:rPr>
-              <a:t>Мобильное устройство </a:t>
+              <a:t>Мобильное устройство</a:t>
+            </a:r>
+            <a:r>
+              <a:rPr lang="en-US" dirty="0">
+                <a:latin typeface="Times New Roman" panose="02020603050405020304" pitchFamily="18" charset="0"/>
+                <a:ea typeface="Calibri" panose="020F0502020204030204" pitchFamily="34" charset="0"/>
+                <a:cs typeface="Times New Roman" panose="02020603050405020304" pitchFamily="18" charset="0"/>
+              </a:rPr>
+              <a:t> </a:t>
+            </a:r>
+            <a:endParaRPr lang="ru-RU" dirty="0">
+              <a:latin typeface="Times New Roman" panose="02020603050405020304" pitchFamily="18" charset="0"/>
+              <a:ea typeface="Calibri" panose="020F0502020204030204" pitchFamily="34" charset="0"/>
+              <a:cs typeface="Times New Roman" panose="02020603050405020304" pitchFamily="18" charset="0"/>
+            </a:endParaRPr>
+          </a:p>
+          <a:p>
+            <a:pPr algn="just">
+              <a:lnSpc>
+                <a:spcPct val="100000"/>
+              </a:lnSpc>
+            </a:pPr>
+            <a:r>
+              <a:rPr lang="ru-RU" dirty="0">
+                <a:latin typeface="Times New Roman" panose="02020603050405020304" pitchFamily="18" charset="0"/>
+                <a:ea typeface="Calibri" panose="020F0502020204030204" pitchFamily="34" charset="0"/>
+                <a:cs typeface="Times New Roman" panose="02020603050405020304" pitchFamily="18" charset="0"/>
+              </a:rPr>
+              <a:t>   на базе </a:t>
             </a:r>
             <a:r>
               <a:rPr lang="en-US" i="1" dirty="0">
@@ -4085,7 +4097,7 @@
                 <a:ea typeface="Calibri" panose="020F0502020204030204" pitchFamily="34" charset="0"/>
                 <a:cs typeface="Times New Roman" panose="02020603050405020304" pitchFamily="18" charset="0"/>
               </a:rPr>
-              <a:t>Android </a:t>
+              <a:t>Android 8</a:t>
             </a:r>
             <a:r>
               <a:rPr lang="ru-RU" dirty="0">
@@ -4093,7 +4105,7 @@
                 <a:ea typeface="Calibri" panose="020F0502020204030204" pitchFamily="34" charset="0"/>
                 <a:cs typeface="Times New Roman" panose="02020603050405020304" pitchFamily="18" charset="0"/>
               </a:rPr>
-              <a:t>5.0 </a:t>
+              <a:t>.0 </a:t>
             </a:r>
             <a:endParaRPr lang="en-US" dirty="0">
               <a:latin typeface="Times New Roman" panose="02020603050405020304" pitchFamily="18" charset="0"/>
@@ -4114,12 +4126,22 @@
                 <a:latin typeface="Times New Roman" panose="02020603050405020304" pitchFamily="18" charset="0"/>
                 <a:cs typeface="Times New Roman" panose="02020603050405020304" pitchFamily="18" charset="0"/>
               </a:rPr>
-              <a:t>Комплексная платформа </a:t>
-            </a:r>
-            <a:endParaRPr lang="en-US" dirty="0">
-              <a:latin typeface="Times New Roman" panose="02020603050405020304" pitchFamily="18" charset="0"/>
-              <a:cs typeface="Times New Roman" panose="02020603050405020304" pitchFamily="18" charset="0"/>
-            </a:endParaRPr>
+              <a:t>Язык программирования</a:t>
+            </a:r>
+            <a:r>
+              <a:rPr lang="en-US" dirty="0">
+                <a:latin typeface="Times New Roman" panose="02020603050405020304" pitchFamily="18" charset="0"/>
+                <a:cs typeface="Times New Roman" panose="02020603050405020304" pitchFamily="18" charset="0"/>
+              </a:rPr>
+              <a:t> </a:t>
+            </a:r>
+            <a:r>
+              <a:rPr lang="en-US" i="1" dirty="0">
+                <a:latin typeface="Times New Roman" panose="02020603050405020304" pitchFamily="18" charset="0"/>
+                <a:cs typeface="Times New Roman" panose="02020603050405020304" pitchFamily="18" charset="0"/>
+              </a:rPr>
+              <a:t>Python </a:t>
+            </a:r>
           </a:p>
           <a:p>
             <a:pPr>
@@ -4128,32 +4150,39 @@
               </a:lnSpc>
             </a:pPr>
             <a:r>
+              <a:rPr lang="en-US" i="1" dirty="0">
+                <a:latin typeface="Times New Roman" panose="02020603050405020304" pitchFamily="18" charset="0"/>
+                <a:cs typeface="Times New Roman" panose="02020603050405020304" pitchFamily="18" charset="0"/>
+              </a:rPr>
+              <a:t>   </a:t>
+            </a:r>
+            <a:r>
+              <a:rPr lang="ru-RU" dirty="0">
+                <a:latin typeface="Times New Roman" panose="02020603050405020304" pitchFamily="18" charset="0"/>
+                <a:cs typeface="Times New Roman" panose="02020603050405020304" pitchFamily="18" charset="0"/>
+              </a:rPr>
+              <a:t>и</a:t>
+            </a:r>
+            <a:r>
               <a:rPr lang="en-US" dirty="0">
                 <a:latin typeface="Times New Roman" panose="02020603050405020304" pitchFamily="18" charset="0"/>
                 <a:cs typeface="Times New Roman" panose="02020603050405020304" pitchFamily="18" charset="0"/>
               </a:rPr>
-              <a:t>    </a:t>
+              <a:t> </a:t>
             </a:r>
             <a:r>
               <a:rPr lang="ru-RU" dirty="0">
                 <a:latin typeface="Times New Roman" panose="02020603050405020304" pitchFamily="18" charset="0"/>
                 <a:cs typeface="Times New Roman" panose="02020603050405020304" pitchFamily="18" charset="0"/>
               </a:rPr>
-              <a:t>мобильной разработки</a:t>
-            </a:r>
-            <a:r>
-              <a:rPr lang="en-US" dirty="0">
-                <a:latin typeface="Times New Roman" panose="02020603050405020304" pitchFamily="18" charset="0"/>
-                <a:cs typeface="Times New Roman" panose="02020603050405020304" pitchFamily="18" charset="0"/>
-              </a:rPr>
-              <a:t> </a:t>
+              <a:t>фреймворк </a:t>
             </a:r>
             <a:r>
               <a:rPr lang="en-US" i="1" dirty="0">
                 <a:latin typeface="Times New Roman" panose="02020603050405020304" pitchFamily="18" charset="0"/>
                 <a:cs typeface="Times New Roman" panose="02020603050405020304" pitchFamily="18" charset="0"/>
               </a:rPr>
-              <a:t>Firebase</a:t>
+              <a:t>Django</a:t>
             </a:r>
             <a:endParaRPr lang="ru-RU" dirty="0">
               <a:latin typeface="Times New Roman" panose="02020603050405020304" pitchFamily="18" charset="0"/>
@@ -4178,14 +4207,28 @@
                 <a:latin typeface="Times New Roman" panose="02020603050405020304" pitchFamily="18" charset="0"/>
                 <a:cs typeface="Times New Roman" panose="02020603050405020304" pitchFamily="18" charset="0"/>
               </a:rPr>
-              <a:t>СУБД </a:t>
-            </a:r>
+              <a:t>СУБД</a:t>
+            </a:r>
+            <a:r>
+              <a:rPr lang="en-US" dirty="0">
+                <a:latin typeface="Times New Roman" panose="02020603050405020304" pitchFamily="18" charset="0"/>
+                <a:cs typeface="Times New Roman" panose="02020603050405020304" pitchFamily="18" charset="0"/>
+              </a:rPr>
+              <a:t> </a:t>
+            </a:r>
+          </a:p>
+          <a:p>
+            <a:pPr>
+              <a:lnSpc>
+                <a:spcPct val="100000"/>
+              </a:lnSpc>
+            </a:pPr>
             <a:r>
               <a:rPr lang="en-US" i="1" dirty="0">
                 <a:latin typeface="Times New Roman" panose="02020603050405020304" pitchFamily="18" charset="0"/>
                 <a:cs typeface="Times New Roman" panose="02020603050405020304" pitchFamily="18" charset="0"/>
               </a:rPr>
-              <a:t>Firebase</a:t>
+              <a:t>   SQLite</a:t>
             </a:r>
             <a:endParaRPr lang="ru-RU" i="1" dirty="0">
               <a:latin typeface="Times New Roman" panose="02020603050405020304" pitchFamily="18" charset="0"/>
@@ -4196,9 +4239,9 @@
       </p:sp>
       <p:pic>
         <p:nvPicPr>
-          <p:cNvPr id="6" name="Рисунок 5"/>
+          <p:cNvPr id="7" name="Picture 4" descr="Image result for chrome"/>
           <p:cNvPicPr>
-            <a:picLocks noChangeAspect="1"/>
+            <a:picLocks noChangeAspect="1" noChangeArrowheads="1"/>
           </p:cNvPicPr>
           <p:nvPr/>
         </p:nvPicPr>
@@ -4210,28 +4253,34 @@
               </a:ext>
             </a:extLst>
           </a:blip>
+          <a:srcRect/>
           <a:stretch>
             <a:fillRect/>
           </a:stretch>
         </p:blipFill>
-        <p:spPr>
-          <a:xfrm>
-            <a:off x="3209788" y="1513502"/>
-            <a:ext cx="775952" cy="775952"/>
+        <p:spPr bwMode="auto">
+          <a:xfrm>
+            <a:off x="5630647" y="2627561"/>
+            <a:ext cx="574002" cy="574002"/>
           </a:xfrm>
           <a:prstGeom prst="rect">
             <a:avLst/>
           </a:prstGeom>
-          <a:ln>
-            <a:solidFill>
-              <a:schemeClr val="bg1"/>
-            </a:solidFill>
-          </a:ln>
+          <a:noFill/>
+          <a:extLst>
+            <a:ext uri="{909E8E84-426E-40DD-AFC4-6F175D3DCCD1}">
+              <a14:hiddenFill xmlns:a14="http://schemas.microsoft.com/office/drawing/2010/main">
+                <a:solidFill>
+                  <a:srgbClr val="FFFFFF"/>
+                </a:solidFill>
+              </a14:hiddenFill>
+            </a:ext>
+          </a:extLst>
         </p:spPr>
       </p:pic>
       <p:pic>
         <p:nvPicPr>
-          <p:cNvPr id="7" name="Picture 4" descr="Image result for chrome"/>
+          <p:cNvPr id="8" name="Picture 6" descr="Image result for firefox"/>
           <p:cNvPicPr>
             <a:picLocks noChangeAspect="1" noChangeArrowheads="1"/>
           </p:cNvPicPr>
@@ -4252,8 +4301,8 @@
         </p:blipFill>
         <p:spPr bwMode="auto">
           <a:xfrm>
-            <a:off x="4448525" y="2418408"/>
-            <a:ext cx="574002" cy="574002"/>
+            <a:off x="4820956" y="2587685"/>
+            <a:ext cx="653755" cy="653755"/>
           </a:xfrm>
           <a:prstGeom prst="rect">
             <a:avLst/>
@@ -4272,9 +4321,15 @@
       </p:pic>
       <p:pic>
         <p:nvPicPr>
-          <p:cNvPr id="8" name="Picture 6" descr="Image result for firefox"/>
+          <p:cNvPr id="4" name="Picture 3">
+            <a:extLst>
+              <a:ext uri="{FF2B5EF4-FFF2-40B4-BE49-F238E27FC236}">
+                <a16:creationId xmlns:a16="http://schemas.microsoft.com/office/drawing/2014/main" id="{0A4BF234-5F26-4094-9393-34FCE6AE3864}"/>
+              </a:ext>
+            </a:extLst>
+          </p:cNvPr>
           <p:cNvPicPr>
-            <a:picLocks noChangeAspect="1" noChangeArrowheads="1"/>
+            <a:picLocks noChangeAspect="1"/>
           </p:cNvPicPr>
           <p:nvPr/>
         </p:nvPicPr>
@@ -4286,36 +4341,31 @@
               </a:ext>
             </a:extLst>
           </a:blip>
-          <a:srcRect/>
           <a:stretch>
             <a:fillRect/>
           </a:stretch>
         </p:blipFill>
-        <p:spPr bwMode="auto">
-          <a:xfrm>
-            <a:off x="3658863" y="2338655"/>
-            <a:ext cx="653755" cy="653755"/>
+        <p:spPr>
+          <a:xfrm>
+            <a:off x="6360585" y="2587684"/>
+            <a:ext cx="653756" cy="653756"/>
           </a:xfrm>
           <a:prstGeom prst="rect">
             <a:avLst/>
           </a:prstGeom>
-          <a:noFill/>
-          <a:extLst>
-            <a:ext uri="{909E8E84-426E-40DD-AFC4-6F175D3DCCD1}">
-              <a14:hiddenFill xmlns:a14="http://schemas.microsoft.com/office/drawing/2010/main">
-                <a:solidFill>
-                  <a:srgbClr val="FFFFFF"/>
-                </a:solidFill>
-              </a14:hiddenFill>
-            </a:ext>
-          </a:extLst>
         </p:spPr>
       </p:pic>
       <p:pic>
         <p:nvPicPr>
-          <p:cNvPr id="9" name="Picture 8" descr="Image result for explorer internet"/>
+          <p:cNvPr id="12" name="Picture 11">
+            <a:extLst>
+              <a:ext uri="{FF2B5EF4-FFF2-40B4-BE49-F238E27FC236}">
+                <a16:creationId xmlns:a16="http://schemas.microsoft.com/office/drawing/2014/main" id="{3B457608-47C5-4059-A949-95E6374F024E}"/>
+              </a:ext>
+            </a:extLst>
+          </p:cNvPr>
           <p:cNvPicPr>
-            <a:picLocks noChangeAspect="1" noChangeArrowheads="1"/>
+            <a:picLocks noChangeAspect="1"/>
           </p:cNvPicPr>
           <p:nvPr/>
         </p:nvPicPr>
@@ -4327,34 +4377,29 @@
               </a:ext>
             </a:extLst>
           </a:blip>
-          <a:srcRect/>
           <a:stretch>
             <a:fillRect/>
           </a:stretch>
         </p:blipFill>
-        <p:spPr bwMode="auto">
-          <a:xfrm>
-            <a:off x="5090817" y="2373951"/>
-            <a:ext cx="657976" cy="657976"/>
+        <p:spPr>
+          <a:xfrm>
+            <a:off x="4100537" y="1540240"/>
+            <a:ext cx="667037" cy="667037"/>
           </a:xfrm>
           <a:prstGeom prst="rect">
             <a:avLst/>
           </a:prstGeom>
-          <a:noFill/>
-          <a:extLst>
-            <a:ext uri="{909E8E84-426E-40DD-AFC4-6F175D3DCCD1}">
-              <a14:hiddenFill xmlns:a14="http://schemas.microsoft.com/office/drawing/2010/main">
-                <a:solidFill>
-                  <a:srgbClr val="FFFFFF"/>
-                </a:solidFill>
-              </a14:hiddenFill>
-            </a:ext>
-          </a:extLst>
         </p:spPr>
       </p:pic>
       <p:pic>
         <p:nvPicPr>
-          <p:cNvPr id="10" name="Рисунок 9"/>
+          <p:cNvPr id="14" name="Picture 13">
+            <a:extLst>
+              <a:ext uri="{FF2B5EF4-FFF2-40B4-BE49-F238E27FC236}">
+                <a16:creationId xmlns:a16="http://schemas.microsoft.com/office/drawing/2014/main" id="{A0D12700-3924-4485-9E25-0ABF213F5F64}"/>
+              </a:ext>
+            </a:extLst>
+          </p:cNvPr>
           <p:cNvPicPr>
             <a:picLocks noChangeAspect="1"/>
           </p:cNvPicPr>
@@ -4374,8 +4419,8 @@
         </p:blipFill>
         <p:spPr>
           <a:xfrm>
-            <a:off x="5402839" y="3109221"/>
-            <a:ext cx="691908" cy="691908"/>
+            <a:off x="3813536" y="3541008"/>
+            <a:ext cx="574002" cy="682049"/>
           </a:xfrm>
           <a:prstGeom prst="rect">
             <a:avLst/>
@@ -4384,9 +4429,15 @@
       </p:pic>
       <p:pic>
         <p:nvPicPr>
-          <p:cNvPr id="3076" name="Picture 4" descr="ÐÐ°ÑÑÐ¸Ð½ÐºÐ¸ Ð¿Ð¾ Ð·Ð°Ð¿ÑÐ¾ÑÑ firebase"/>
+          <p:cNvPr id="16" name="Picture 15">
+            <a:extLst>
+              <a:ext uri="{FF2B5EF4-FFF2-40B4-BE49-F238E27FC236}">
+                <a16:creationId xmlns:a16="http://schemas.microsoft.com/office/drawing/2014/main" id="{264C1762-5399-42D7-9DCB-49C0DD2E21C0}"/>
+              </a:ext>
+            </a:extLst>
+          </p:cNvPr>
           <p:cNvPicPr>
-            <a:picLocks noChangeAspect="1" noChangeArrowheads="1"/>
+            <a:picLocks noChangeAspect="1"/>
           </p:cNvPicPr>
           <p:nvPr/>
         </p:nvPicPr>
@@ -4398,29 +4449,90 @@
               </a:ext>
             </a:extLst>
           </a:blip>
-          <a:srcRect/>
           <a:stretch>
             <a:fillRect/>
           </a:stretch>
         </p:blipFill>
-        <p:spPr bwMode="auto">
-          <a:xfrm>
-            <a:off x="4743069" y="4253738"/>
-            <a:ext cx="1005724" cy="1005724"/>
+        <p:spPr>
+          <a:xfrm>
+            <a:off x="4927488" y="4484453"/>
+            <a:ext cx="861112" cy="861112"/>
           </a:xfrm>
           <a:prstGeom prst="rect">
             <a:avLst/>
           </a:prstGeom>
-          <a:noFill/>
-          <a:extLst>
-            <a:ext uri="{909E8E84-426E-40DD-AFC4-6F175D3DCCD1}">
-              <a14:hiddenFill xmlns:a14="http://schemas.microsoft.com/office/drawing/2010/main">
-                <a:solidFill>
-                  <a:srgbClr val="FFFFFF"/>
-                </a:solidFill>
-              </a14:hiddenFill>
-            </a:ext>
-          </a:extLst>
+        </p:spPr>
+      </p:pic>
+      <p:pic>
+        <p:nvPicPr>
+          <p:cNvPr id="18" name="Picture 17">
+            <a:extLst>
+              <a:ext uri="{FF2B5EF4-FFF2-40B4-BE49-F238E27FC236}">
+                <a16:creationId xmlns:a16="http://schemas.microsoft.com/office/drawing/2014/main" id="{FC428898-5C1A-48BB-BD49-CE505BDB590C}"/>
+              </a:ext>
+            </a:extLst>
+          </p:cNvPr>
+          <p:cNvPicPr>
+            <a:picLocks noChangeAspect="1"/>
+          </p:cNvPicPr>
+          <p:nvPr/>
+        </p:nvPicPr>
+        <p:blipFill>
+          <a:blip r:embed="rId8" cstate="print">
+            <a:extLst>
+              <a:ext uri="{28A0092B-C50C-407E-A947-70E740481C1C}">
+                <a14:useLocalDpi xmlns:a14="http://schemas.microsoft.com/office/drawing/2010/main" val="0"/>
+              </a:ext>
+            </a:extLst>
+          </a:blip>
+          <a:stretch>
+            <a:fillRect/>
+          </a:stretch>
+        </p:blipFill>
+        <p:spPr>
+          <a:xfrm>
+            <a:off x="6435916" y="4484453"/>
+            <a:ext cx="1747730" cy="795217"/>
+          </a:xfrm>
+          <a:prstGeom prst="rect">
+            <a:avLst/>
+          </a:prstGeom>
+        </p:spPr>
+      </p:pic>
+      <p:pic>
+        <p:nvPicPr>
+          <p:cNvPr id="20" name="Picture 19">
+            <a:extLst>
+              <a:ext uri="{FF2B5EF4-FFF2-40B4-BE49-F238E27FC236}">
+                <a16:creationId xmlns:a16="http://schemas.microsoft.com/office/drawing/2014/main" id="{53A58C91-C4B9-4911-A48D-EF3F5E7F908E}"/>
+              </a:ext>
+            </a:extLst>
+          </p:cNvPr>
+          <p:cNvPicPr>
+            <a:picLocks noChangeAspect="1"/>
+          </p:cNvPicPr>
+          <p:nvPr/>
+        </p:nvPicPr>
+        <p:blipFill>
+          <a:blip r:embed="rId9" cstate="print">
+            <a:extLst>
+              <a:ext uri="{28A0092B-C50C-407E-A947-70E740481C1C}">
+                <a14:useLocalDpi xmlns:a14="http://schemas.microsoft.com/office/drawing/2010/main" val="0"/>
+              </a:ext>
+            </a:extLst>
+          </a:blip>
+          <a:stretch>
+            <a:fillRect/>
+          </a:stretch>
+        </p:blipFill>
+        <p:spPr>
+          <a:xfrm>
+            <a:off x="1637383" y="5473452"/>
+            <a:ext cx="1540258" cy="730339"/>
+          </a:xfrm>
+          <a:prstGeom prst="rect">
+            <a:avLst/>
+          </a:prstGeom>
         </p:spPr>
       </p:pic>
     </p:spTree>
@@ -4488,22 +4600,34 @@
       </p:sp>
       <p:pic>
         <p:nvPicPr>
-          <p:cNvPr id="5" name="Рисунок 4"/>
+          <p:cNvPr id="4" name="Picture 3">
+            <a:extLst>
+              <a:ext uri="{FF2B5EF4-FFF2-40B4-BE49-F238E27FC236}">
+                <a16:creationId xmlns:a16="http://schemas.microsoft.com/office/drawing/2014/main" id="{42E51179-0A8B-416E-973E-3DCD8FA1C094}"/>
+              </a:ext>
+            </a:extLst>
+          </p:cNvPr>
           <p:cNvPicPr>
             <a:picLocks noChangeAspect="1"/>
           </p:cNvPicPr>
           <p:nvPr/>
         </p:nvPicPr>
         <p:blipFill>
-          <a:blip r:embed="rId2"/>
+          <a:blip r:embed="rId2" cstate="print">
+            <a:extLst>
+              <a:ext uri="{28A0092B-C50C-407E-A947-70E740481C1C}">
+                <a14:useLocalDpi xmlns:a14="http://schemas.microsoft.com/office/drawing/2010/main" val="0"/>
+              </a:ext>
+            </a:extLst>
+          </a:blip>
           <a:stretch>
             <a:fillRect/>
           </a:stretch>
         </p:blipFill>
         <p:spPr>
           <a:xfrm>
-            <a:off x="270456" y="824248"/>
-            <a:ext cx="8558494" cy="5707064"/>
+            <a:off x="1370447" y="964611"/>
+            <a:ext cx="6403105" cy="5815740"/>
           </a:xfrm>
           <a:prstGeom prst="rect">
             <a:avLst/>
@@ -4586,7 +4710,7 @@
         <p:spPr>
           <a:xfrm>
             <a:off x="356628" y="1236371"/>
-            <a:ext cx="8608539" cy="1569660"/>
+            <a:ext cx="8608539" cy="1938992"/>
           </a:xfrm>
           <a:prstGeom prst="rect">
             <a:avLst/>
@@ -4604,7 +4728,7 @@
                 <a:latin typeface="Times New Roman" panose="02020603050405020304" pitchFamily="18" charset="0"/>
                 <a:cs typeface="Times New Roman" panose="02020603050405020304" pitchFamily="18" charset="0"/>
               </a:rPr>
-              <a:t>В результате была спроектирована и разработана автоматизированная система заказов билетов на междугородний пассажирский транспорт, удовлетворяющий требованиям предметной области дипломного проекта. </a:t>
+              <a:t>В результате проделаннаой работы была спроектирована и разработана автоматизированная система управления полочным пространством супермаркета, выполняющая поставленные задачи и удовлетворяющая требованиям предметной области дипломного проекта. </a:t>
             </a:r>
           </a:p>
         </p:txBody>
@@ -5341,15 +5465,23 @@
                 <a:latin typeface="Times New Roman" panose="02020603050405020304" pitchFamily="18" charset="0"/>
                 <a:cs typeface="Times New Roman" panose="02020603050405020304" pitchFamily="18" charset="0"/>
               </a:rPr>
-              <a:t>Структура автоматизированной системы</a:t>
+              <a:t>Диаграмма декомпозиции</a:t>
             </a:r>
           </a:p>
         </p:txBody>
       </p:sp>
       <p:pic>
         <p:nvPicPr>
-          <p:cNvPr id="3" name="Рисунок 2" descr="1525124241242142авм4п"/>
-          <p:cNvPicPr/>
+          <p:cNvPr id="5" name="Picture 4">
+            <a:extLst>
+              <a:ext uri="{FF2B5EF4-FFF2-40B4-BE49-F238E27FC236}">
+                <a16:creationId xmlns:a16="http://schemas.microsoft.com/office/drawing/2014/main" id="{D6C824EE-0E09-47A4-A2FA-7A87A44CCA6E}"/>
+              </a:ext>
+            </a:extLst>
+          </p:cNvPr>
+          <p:cNvPicPr>
+            <a:picLocks noChangeAspect="1"/>
+          </p:cNvPicPr>
           <p:nvPr/>
         </p:nvPicPr>
         <p:blipFill>
@@ -5360,23 +5492,18 @@
               </a:ext>
             </a:extLst>
           </a:blip>
-          <a:srcRect/>
           <a:stretch>
             <a:fillRect/>
           </a:stretch>
         </p:blipFill>
-        <p:spPr bwMode="auto">
-          <a:xfrm>
-            <a:off x="218941" y="1043189"/>
-            <a:ext cx="8744755" cy="5689155"/>
+        <p:spPr>
+          <a:xfrm>
+            <a:off x="392180" y="1043189"/>
+            <a:ext cx="8398276" cy="5538322"/>
           </a:xfrm>
           <a:prstGeom prst="rect">
             <a:avLst/>
           </a:prstGeom>
-          <a:noFill/>
-          <a:ln>
-            <a:noFill/>
-          </a:ln>
         </p:spPr>
       </p:pic>
     </p:spTree>
@@ -5437,7 +5564,7 @@
                 <a:latin typeface="Times New Roman" panose="02020603050405020304" pitchFamily="18" charset="0"/>
                 <a:cs typeface="Times New Roman" panose="02020603050405020304" pitchFamily="18" charset="0"/>
               </a:rPr>
-              <a:t>Схема алгоритма работы системы</a:t>
+              <a:t>Схема базы данных</a:t>
             </a:r>
           </a:p>
         </p:txBody>
@@ -5505,6 +5632,42 @@
           </a:p>
         </p:txBody>
       </p:sp>
+      <p:pic>
+        <p:nvPicPr>
+          <p:cNvPr id="5" name="Picture 4">
+            <a:extLst>
+              <a:ext uri="{FF2B5EF4-FFF2-40B4-BE49-F238E27FC236}">
+                <a16:creationId xmlns:a16="http://schemas.microsoft.com/office/drawing/2014/main" id="{47D0A320-05DE-4FF6-BAED-6960BED96447}"/>
+              </a:ext>
+            </a:extLst>
+          </p:cNvPr>
+          <p:cNvPicPr>
+            <a:picLocks noChangeAspect="1"/>
+          </p:cNvPicPr>
+          <p:nvPr/>
+        </p:nvPicPr>
+        <p:blipFill>
+          <a:blip r:embed="rId2">
+            <a:extLst>
+              <a:ext uri="{28A0092B-C50C-407E-A947-70E740481C1C}">
+                <a14:useLocalDpi xmlns:a14="http://schemas.microsoft.com/office/drawing/2010/main" val="0"/>
+              </a:ext>
+            </a:extLst>
+          </a:blip>
+          <a:stretch>
+            <a:fillRect/>
+          </a:stretch>
+        </p:blipFill>
+        <p:spPr>
+          <a:xfrm>
+            <a:off x="294447" y="898872"/>
+            <a:ext cx="8580864" cy="5791702"/>
+          </a:xfrm>
+          <a:prstGeom prst="rect">
+            <a:avLst/>
+          </a:prstGeom>
+        </p:spPr>
+      </p:pic>
     </p:spTree>
     <p:extLst>
       <p:ext uri="{BB962C8B-B14F-4D97-AF65-F5344CB8AC3E}">
@@ -5563,7 +5726,7 @@
                 <a:latin typeface="Times New Roman" panose="02020603050405020304" pitchFamily="18" charset="0"/>
                 <a:cs typeface="Times New Roman" panose="02020603050405020304" pitchFamily="18" charset="0"/>
               </a:rPr>
-              <a:t>Схема алгоритма регистрации маршрута</a:t>
+              <a:t>Схема алгоритма фукнционирования</a:t>
             </a:r>
           </a:p>
         </p:txBody>
@@ -5631,73 +5794,42 @@
           </a:p>
         </p:txBody>
       </p:sp>
-      <p:graphicFrame>
-        <p:nvGraphicFramePr>
-          <p:cNvPr id="4" name="Объект 3"/>
-          <p:cNvGraphicFramePr>
-            <a:graphicFrameLocks noChangeAspect="1"/>
-          </p:cNvGraphicFramePr>
-          <p:nvPr>
-            <p:extLst>
-              <p:ext uri="{D42A27DB-BD31-4B8C-83A1-F6EECF244321}">
-                <p14:modId xmlns:p14="http://schemas.microsoft.com/office/powerpoint/2010/main" val="2974161586"/>
-              </p:ext>
-            </p:extLst>
-          </p:nvPr>
-        </p:nvGraphicFramePr>
-        <p:xfrm>
-          <a:off x="3387143" y="927279"/>
-          <a:ext cx="2176530" cy="5878604"/>
-        </p:xfrm>
-        <a:graphic>
-          <a:graphicData uri="http://schemas.openxmlformats.org/presentationml/2006/ole">
-            <mc:AlternateContent xmlns:mc="http://schemas.openxmlformats.org/markup-compatibility/2006">
-              <mc:Choice xmlns:v="urn:schemas-microsoft-com:vml" Requires="v">
-                <p:oleObj spid="_x0000_s2070" name="Visio" r:id="rId3" imgW="3762265" imgH="10144249" progId="Visio.Drawing.15">
-                  <p:embed/>
-                </p:oleObj>
-              </mc:Choice>
-              <mc:Fallback>
-                <p:oleObj name="Visio" r:id="rId3" imgW="3762265" imgH="10144249" progId="Visio.Drawing.15">
-                  <p:embed/>
-                  <p:pic>
-                    <p:nvPicPr>
-                      <p:cNvPr id="0" name="Object 1"/>
-                      <p:cNvPicPr>
-                        <a:picLocks noChangeAspect="1" noChangeArrowheads="1"/>
-                      </p:cNvPicPr>
-                      <p:nvPr/>
-                    </p:nvPicPr>
-                    <p:blipFill>
-                      <a:blip r:embed="rId4">
-                        <a:extLst>
-                          <a:ext uri="{28A0092B-C50C-407E-A947-70E740481C1C}">
-                            <a14:useLocalDpi xmlns:a14="http://schemas.microsoft.com/office/drawing/2010/main" val="0"/>
-                          </a:ext>
-                        </a:extLst>
-                      </a:blip>
-                      <a:srcRect/>
-                      <a:stretch>
-                        <a:fillRect/>
-                      </a:stretch>
-                    </p:blipFill>
-                    <p:spPr bwMode="auto">
-                      <a:xfrm>
-                        <a:off x="3387143" y="927279"/>
-                        <a:ext cx="2176530" cy="5878604"/>
-                      </a:xfrm>
-                      <a:prstGeom prst="rect">
-                        <a:avLst/>
-                      </a:prstGeom>
-                      <a:noFill/>
-                    </p:spPr>
-                  </p:pic>
-                </p:oleObj>
-              </mc:Fallback>
-            </mc:AlternateContent>
-          </a:graphicData>
-        </a:graphic>
-      </p:graphicFrame>
+      <p:pic>
+        <p:nvPicPr>
+          <p:cNvPr id="8" name="Picture 7">
+            <a:extLst>
+              <a:ext uri="{FF2B5EF4-FFF2-40B4-BE49-F238E27FC236}">
+                <a16:creationId xmlns:a16="http://schemas.microsoft.com/office/drawing/2014/main" id="{E86A6189-E3C7-4CC8-8263-E915A8912D4E}"/>
+              </a:ext>
+            </a:extLst>
+          </p:cNvPr>
+          <p:cNvPicPr>
+            <a:picLocks noChangeAspect="1"/>
+          </p:cNvPicPr>
+          <p:nvPr/>
+        </p:nvPicPr>
+        <p:blipFill>
+          <a:blip r:embed="rId2" cstate="print">
+            <a:extLst>
+              <a:ext uri="{28A0092B-C50C-407E-A947-70E740481C1C}">
+                <a14:useLocalDpi xmlns:a14="http://schemas.microsoft.com/office/drawing/2010/main" val="0"/>
+              </a:ext>
+            </a:extLst>
+          </a:blip>
+          <a:stretch>
+            <a:fillRect/>
+          </a:stretch>
+        </p:blipFill>
+        <p:spPr>
+          <a:xfrm>
+            <a:off x="2560777" y="927279"/>
+            <a:ext cx="4022446" cy="5860759"/>
+          </a:xfrm>
+          <a:prstGeom prst="rect">
+            <a:avLst/>
+          </a:prstGeom>
+        </p:spPr>
+      </p:pic>
     </p:spTree>
     <p:extLst>
       <p:ext uri="{BB962C8B-B14F-4D97-AF65-F5344CB8AC3E}">
@@ -5756,14 +5888,20 @@
                 <a:latin typeface="Times New Roman" panose="02020603050405020304" pitchFamily="18" charset="0"/>
                 <a:cs typeface="Times New Roman" panose="02020603050405020304" pitchFamily="18" charset="0"/>
               </a:rPr>
-              <a:t>Структурная схема базы данных</a:t>
+              <a:t>Структура программного обеспечения</a:t>
             </a:r>
           </a:p>
         </p:txBody>
       </p:sp>
       <p:pic>
         <p:nvPicPr>
-          <p:cNvPr id="5" name="Рисунок 4"/>
+          <p:cNvPr id="4" name="Picture 3">
+            <a:extLst>
+              <a:ext uri="{FF2B5EF4-FFF2-40B4-BE49-F238E27FC236}">
+                <a16:creationId xmlns:a16="http://schemas.microsoft.com/office/drawing/2014/main" id="{718830F1-39E2-4FFC-A90B-3691BCB82BDB}"/>
+              </a:ext>
+            </a:extLst>
+          </p:cNvPr>
           <p:cNvPicPr>
             <a:picLocks noChangeAspect="1"/>
           </p:cNvPicPr>
@@ -5783,8 +5921,8 @@
         </p:blipFill>
         <p:spPr>
           <a:xfrm>
-            <a:off x="508715" y="850006"/>
-            <a:ext cx="8242479" cy="5808371"/>
+            <a:off x="470766" y="850007"/>
+            <a:ext cx="8318377" cy="5916279"/>
           </a:xfrm>
           <a:prstGeom prst="rect">
             <a:avLst/>

</xml_diff>